<commit_message>
added Appendix D and E showing how Event-B logic is derived from SCXML simulation algorithm
</commit_message>
<xml_diff>
--- a/manuscripts/IFM2017/SCXML_Scenarios.pptx
+++ b/manuscripts/IFM2017/SCXML_Scenarios.pptx
@@ -5,14 +5,15 @@
     <p:sldMasterId id="2147483648" r:id="rId1"/>
   </p:sldMasterIdLst>
   <p:notesMasterIdLst>
-    <p:notesMasterId r:id="rId7"/>
+    <p:notesMasterId r:id="rId8"/>
   </p:notesMasterIdLst>
   <p:sldIdLst>
     <p:sldId id="256" r:id="rId2"/>
     <p:sldId id="257" r:id="rId3"/>
     <p:sldId id="258" r:id="rId4"/>
     <p:sldId id="260" r:id="rId5"/>
-    <p:sldId id="259" r:id="rId6"/>
+    <p:sldId id="261" r:id="rId6"/>
+    <p:sldId id="259" r:id="rId7"/>
   </p:sldIdLst>
   <p:sldSz cx="12192000" cy="6858000"/>
   <p:notesSz cx="6858000" cy="9144000"/>
@@ -111,6 +112,11 @@
       </a:defRPr>
     </a:lvl9pPr>
   </p:defaultTextStyle>
+  <p:extLst>
+    <p:ext uri="{EFAFB233-063F-42B5-8137-9DF3F51BA10A}">
+      <p15:sldGuideLst xmlns:p15="http://schemas.microsoft.com/office/powerpoint/2012/main"/>
+    </p:ext>
+  </p:extLst>
 </p:presentation>
 </file>
 
@@ -196,7 +202,7 @@
           <a:p>
             <a:fld id="{023250E4-6F58-D948-B579-8AA073E2C43C}" type="datetimeFigureOut">
               <a:rPr lang="en-US" smtClean="0"/>
-              <a:t>5/2/17</a:t>
+              <a:t>6/24/17</a:t>
             </a:fld>
             <a:endParaRPr lang="en-US"/>
           </a:p>
@@ -595,7 +601,7 @@
           <a:p>
             <a:fld id="{D939D837-38DD-7C49-99B8-A2DB2595A4E0}" type="datetimeFigureOut">
               <a:rPr lang="en-US" smtClean="0"/>
-              <a:t>5/2/17</a:t>
+              <a:t>6/24/17</a:t>
             </a:fld>
             <a:endParaRPr lang="en-US"/>
           </a:p>
@@ -765,7 +771,7 @@
           <a:p>
             <a:fld id="{D939D837-38DD-7C49-99B8-A2DB2595A4E0}" type="datetimeFigureOut">
               <a:rPr lang="en-US" smtClean="0"/>
-              <a:t>5/2/17</a:t>
+              <a:t>6/24/17</a:t>
             </a:fld>
             <a:endParaRPr lang="en-US"/>
           </a:p>
@@ -945,7 +951,7 @@
           <a:p>
             <a:fld id="{D939D837-38DD-7C49-99B8-A2DB2595A4E0}" type="datetimeFigureOut">
               <a:rPr lang="en-US" smtClean="0"/>
-              <a:t>5/2/17</a:t>
+              <a:t>6/24/17</a:t>
             </a:fld>
             <a:endParaRPr lang="en-US"/>
           </a:p>
@@ -1115,7 +1121,7 @@
           <a:p>
             <a:fld id="{D939D837-38DD-7C49-99B8-A2DB2595A4E0}" type="datetimeFigureOut">
               <a:rPr lang="en-US" smtClean="0"/>
-              <a:t>5/2/17</a:t>
+              <a:t>6/24/17</a:t>
             </a:fld>
             <a:endParaRPr lang="en-US"/>
           </a:p>
@@ -1361,7 +1367,7 @@
           <a:p>
             <a:fld id="{D939D837-38DD-7C49-99B8-A2DB2595A4E0}" type="datetimeFigureOut">
               <a:rPr lang="en-US" smtClean="0"/>
-              <a:t>5/2/17</a:t>
+              <a:t>6/24/17</a:t>
             </a:fld>
             <a:endParaRPr lang="en-US"/>
           </a:p>
@@ -1593,7 +1599,7 @@
           <a:p>
             <a:fld id="{D939D837-38DD-7C49-99B8-A2DB2595A4E0}" type="datetimeFigureOut">
               <a:rPr lang="en-US" smtClean="0"/>
-              <a:t>5/2/17</a:t>
+              <a:t>6/24/17</a:t>
             </a:fld>
             <a:endParaRPr lang="en-US"/>
           </a:p>
@@ -1960,7 +1966,7 @@
           <a:p>
             <a:fld id="{D939D837-38DD-7C49-99B8-A2DB2595A4E0}" type="datetimeFigureOut">
               <a:rPr lang="en-US" smtClean="0"/>
-              <a:t>5/2/17</a:t>
+              <a:t>6/24/17</a:t>
             </a:fld>
             <a:endParaRPr lang="en-US"/>
           </a:p>
@@ -2078,7 +2084,7 @@
           <a:p>
             <a:fld id="{D939D837-38DD-7C49-99B8-A2DB2595A4E0}" type="datetimeFigureOut">
               <a:rPr lang="en-US" smtClean="0"/>
-              <a:t>5/2/17</a:t>
+              <a:t>6/24/17</a:t>
             </a:fld>
             <a:endParaRPr lang="en-US"/>
           </a:p>
@@ -2173,7 +2179,7 @@
           <a:p>
             <a:fld id="{D939D837-38DD-7C49-99B8-A2DB2595A4E0}" type="datetimeFigureOut">
               <a:rPr lang="en-US" smtClean="0"/>
-              <a:t>5/2/17</a:t>
+              <a:t>6/24/17</a:t>
             </a:fld>
             <a:endParaRPr lang="en-US"/>
           </a:p>
@@ -2450,7 +2456,7 @@
           <a:p>
             <a:fld id="{D939D837-38DD-7C49-99B8-A2DB2595A4E0}" type="datetimeFigureOut">
               <a:rPr lang="en-US" smtClean="0"/>
-              <a:t>5/2/17</a:t>
+              <a:t>6/24/17</a:t>
             </a:fld>
             <a:endParaRPr lang="en-US"/>
           </a:p>
@@ -2703,7 +2709,7 @@
           <a:p>
             <a:fld id="{D939D837-38DD-7C49-99B8-A2DB2595A4E0}" type="datetimeFigureOut">
               <a:rPr lang="en-US" smtClean="0"/>
-              <a:t>5/2/17</a:t>
+              <a:t>6/24/17</a:t>
             </a:fld>
             <a:endParaRPr lang="en-US"/>
           </a:p>
@@ -2916,7 +2922,7 @@
           <a:p>
             <a:fld id="{D939D837-38DD-7C49-99B8-A2DB2595A4E0}" type="datetimeFigureOut">
               <a:rPr lang="en-US" smtClean="0"/>
-              <a:t>5/2/17</a:t>
+              <a:t>6/24/17</a:t>
             </a:fld>
             <a:endParaRPr lang="en-US"/>
           </a:p>
@@ -3425,7 +3431,7 @@
         <p:spPr>
           <a:xfrm>
             <a:off x="5087566" y="1566154"/>
-            <a:ext cx="6468894" cy="4154984"/>
+            <a:ext cx="6468894" cy="4708981"/>
           </a:xfrm>
           <a:prstGeom prst="rect">
             <a:avLst/>
@@ -3452,16 +3458,35 @@
           <a:p>
             <a:r>
               <a:rPr lang="en-US" dirty="0" smtClean="0"/>
-              <a:t>Or one at a time depending on other guards such as source state.</a:t>
-            </a:r>
-          </a:p>
-          <a:p>
+              <a:t>Or one at a time depending on other guards such as source state</a:t>
+            </a:r>
+            <a:r>
+              <a:rPr lang="en-US" dirty="0" smtClean="0"/>
+              <a:t>.</a:t>
+            </a:r>
+          </a:p>
+          <a:p>
+            <a:r>
+              <a:rPr lang="en-US" dirty="0" smtClean="0"/>
+              <a:t>Or the trigger could be consumed when neither transition is available</a:t>
+            </a:r>
             <a:endParaRPr lang="en-US" dirty="0" smtClean="0"/>
           </a:p>
           <a:p>
-            <a:r>
-              <a:rPr lang="en-US" dirty="0" smtClean="0"/>
-              <a:t>We could represent these options as 3 events:</a:t>
+            <a:endParaRPr lang="en-US" dirty="0" smtClean="0"/>
+          </a:p>
+          <a:p>
+            <a:r>
+              <a:rPr lang="en-US" dirty="0" smtClean="0"/>
+              <a:t>We could represent these options as </a:t>
+            </a:r>
+            <a:r>
+              <a:rPr lang="en-US" dirty="0" smtClean="0"/>
+              <a:t>4 </a:t>
+            </a:r>
+            <a:r>
+              <a:rPr lang="en-US" dirty="0" smtClean="0"/>
+              <a:t>events:</a:t>
             </a:r>
           </a:p>
           <a:p>
@@ -3470,7 +3495,17 @@
           <a:p>
             <a:r>
               <a:rPr lang="en-US" dirty="0" smtClean="0"/>
-              <a:t>E1: [A &amp; ~C &amp; t]/ T1 </a:t>
+              <a:t>E0: [~A &amp; ~C &amp; t]/skip</a:t>
+            </a:r>
+          </a:p>
+          <a:p>
+            <a:r>
+              <a:rPr lang="en-US" dirty="0" smtClean="0"/>
+              <a:t>E1</a:t>
+            </a:r>
+            <a:r>
+              <a:rPr lang="en-US" dirty="0" smtClean="0"/>
+              <a:t>: [A &amp; ~C &amp; t]/ T1 </a:t>
             </a:r>
           </a:p>
           <a:p>
@@ -3487,9 +3522,6 @@
           </a:p>
           <a:p>
             <a:endParaRPr lang="en-US" dirty="0" smtClean="0"/>
-          </a:p>
-          <a:p>
-            <a:endParaRPr lang="en-US" dirty="0"/>
           </a:p>
           <a:p>
             <a:endParaRPr lang="en-US" dirty="0"/>
@@ -3588,7 +3620,7 @@
         <p:spPr>
           <a:xfrm>
             <a:off x="4970834" y="1690688"/>
-            <a:ext cx="6468894" cy="4524315"/>
+            <a:ext cx="6468894" cy="4801314"/>
           </a:xfrm>
           <a:prstGeom prst="rect">
             <a:avLst/>
@@ -3616,6 +3648,25 @@
             </a:r>
           </a:p>
           <a:p>
+            <a:endParaRPr lang="en-US" dirty="0" smtClean="0"/>
+          </a:p>
+          <a:p>
+            <a:r>
+              <a:rPr lang="en-US" dirty="0"/>
+              <a:t>E0: [~A &amp; ~C </a:t>
+            </a:r>
+            <a:r>
+              <a:rPr lang="en-US" dirty="0" smtClean="0"/>
+              <a:t>&amp; ~E &amp; </a:t>
+            </a:r>
+            <a:r>
+              <a:rPr lang="en-US" dirty="0"/>
+              <a:t>t]/</a:t>
+            </a:r>
+            <a:r>
+              <a:rPr lang="en-US" dirty="0" smtClean="0"/>
+              <a:t>skip</a:t>
+            </a:r>
             <a:endParaRPr lang="en-US" dirty="0"/>
           </a:p>
           <a:p>
@@ -3639,57 +3690,25 @@
           <a:p>
             <a:r>
               <a:rPr lang="en-US" dirty="0" smtClean="0"/>
-              <a:t>E4: [</a:t>
-            </a:r>
-            <a:r>
-              <a:rPr lang="en-US" dirty="0" smtClean="0"/>
-              <a:t>~A &amp; ~C &amp; </a:t>
-            </a:r>
-            <a:r>
-              <a:rPr lang="en-US" dirty="0" smtClean="0"/>
-              <a:t>E &amp; t]/ T3</a:t>
-            </a:r>
-          </a:p>
-          <a:p>
-            <a:r>
-              <a:rPr lang="en-US" dirty="0" smtClean="0"/>
-              <a:t>E5: </a:t>
-            </a:r>
-            <a:r>
-              <a:rPr lang="en-US" dirty="0" smtClean="0"/>
-              <a:t>[A &amp; ~C &amp; E &amp; t]/ (</a:t>
-            </a:r>
-            <a:r>
-              <a:rPr lang="en-US" dirty="0" smtClean="0"/>
-              <a:t>T1 || T3) 	(refines E1)</a:t>
-            </a:r>
-          </a:p>
-          <a:p>
-            <a:r>
-              <a:rPr lang="en-US" dirty="0" smtClean="0"/>
-              <a:t>E6: </a:t>
-            </a:r>
-            <a:r>
-              <a:rPr lang="en-US" dirty="0" smtClean="0"/>
-              <a:t>[~A &amp; C &amp; E &amp; t]/ (</a:t>
-            </a:r>
-            <a:r>
-              <a:rPr lang="en-US" dirty="0" smtClean="0"/>
-              <a:t>T2 || T3 )	(refines E2)</a:t>
-            </a:r>
-          </a:p>
-          <a:p>
-            <a:r>
-              <a:rPr lang="en-US" dirty="0" smtClean="0"/>
-              <a:t>E7: </a:t>
-            </a:r>
-            <a:r>
-              <a:rPr lang="en-US" dirty="0" smtClean="0"/>
-              <a:t>[A &amp; C &amp; E &amp; t]/ (</a:t>
-            </a:r>
-            <a:r>
-              <a:rPr lang="en-US" dirty="0" smtClean="0"/>
-              <a:t>T1 || T2 || T3) 	(refines E3)</a:t>
+              <a:t>E4: [~A &amp; ~C &amp; E &amp; t]/ T3</a:t>
+            </a:r>
+          </a:p>
+          <a:p>
+            <a:r>
+              <a:rPr lang="en-US" dirty="0" smtClean="0"/>
+              <a:t>E5: [A &amp; ~C &amp; E &amp; t]/ (T1 || T3) 	(refines E1)</a:t>
+            </a:r>
+          </a:p>
+          <a:p>
+            <a:r>
+              <a:rPr lang="en-US" dirty="0" smtClean="0"/>
+              <a:t>E6: [~A &amp; C &amp; E &amp; t]/ (T2 || T3 )	(refines E2)</a:t>
+            </a:r>
+          </a:p>
+          <a:p>
+            <a:r>
+              <a:rPr lang="en-US" dirty="0" smtClean="0"/>
+              <a:t>E7: [A &amp; C &amp; E &amp; t]/ (T1 || T2 || T3) 	(refines E3)</a:t>
             </a:r>
           </a:p>
           <a:p>
@@ -3790,7 +3809,7 @@
         <p:spPr>
           <a:xfrm>
             <a:off x="4727643" y="1441990"/>
-            <a:ext cx="7072007" cy="5355312"/>
+            <a:ext cx="7072007" cy="5632311"/>
           </a:xfrm>
           <a:prstGeom prst="rect">
             <a:avLst/>
@@ -3826,6 +3845,25 @@
             </a:r>
           </a:p>
           <a:p>
+            <a:endParaRPr lang="en-US" dirty="0" smtClean="0"/>
+          </a:p>
+          <a:p>
+            <a:r>
+              <a:rPr lang="en-US" dirty="0"/>
+              <a:t>E0: [~A &amp; ~C &amp; ~</a:t>
+            </a:r>
+            <a:r>
+              <a:rPr lang="en-US" dirty="0" smtClean="0"/>
+              <a:t>E2 </a:t>
+            </a:r>
+            <a:r>
+              <a:rPr lang="en-US" dirty="0"/>
+              <a:t>&amp; t]/</a:t>
+            </a:r>
+            <a:r>
+              <a:rPr lang="en-US" dirty="0" smtClean="0"/>
+              <a:t>skip</a:t>
+            </a:r>
             <a:endParaRPr lang="en-US" dirty="0"/>
           </a:p>
           <a:p>
@@ -3894,13 +3932,24 @@
                   <a:srgbClr val="FF0000"/>
                 </a:solidFill>
               </a:rPr>
-              <a:t>   E2 =&gt; E,   but ~E2 /=&gt; ~E    Hence E1-3 are not correct refinements</a:t>
-            </a:r>
-            <a:endParaRPr lang="en-US" i="1" dirty="0" smtClean="0">
-              <a:solidFill>
-                <a:srgbClr val="FF0000"/>
-              </a:solidFill>
-            </a:endParaRPr>
+              <a:t>   E2 =&gt; E,   but ~E2 /=&gt; ~E    Hence </a:t>
+            </a:r>
+            <a:r>
+              <a:rPr lang="en-US" i="1" dirty="0" smtClean="0">
+                <a:solidFill>
+                  <a:srgbClr val="FF0000"/>
+                </a:solidFill>
+              </a:rPr>
+              <a:t>E0-3 </a:t>
+            </a:r>
+            <a:r>
+              <a:rPr lang="en-US" i="1" dirty="0" smtClean="0">
+                <a:solidFill>
+                  <a:srgbClr val="FF0000"/>
+                </a:solidFill>
+              </a:rPr>
+              <a:t>are not correct refinements</a:t>
+            </a:r>
           </a:p>
         </p:txBody>
       </p:sp>
@@ -3942,6 +3991,200 @@
 </file>
 
 <file path=ppt/slides/slide5.xml><?xml version="1.0" encoding="utf-8"?>
+<p:sld xmlns:a="http://schemas.openxmlformats.org/drawingml/2006/main" xmlns:r="http://schemas.openxmlformats.org/officeDocument/2006/relationships" xmlns:p="http://schemas.openxmlformats.org/presentationml/2006/main">
+  <p:cSld>
+    <p:spTree>
+      <p:nvGrpSpPr>
+        <p:cNvPr id="1" name=""/>
+        <p:cNvGrpSpPr/>
+        <p:nvPr/>
+      </p:nvGrpSpPr>
+      <p:grpSpPr>
+        <a:xfrm>
+          <a:off x="0" y="0"/>
+          <a:ext cx="0" cy="0"/>
+          <a:chOff x="0" y="0"/>
+          <a:chExt cx="0" cy="0"/>
+        </a:xfrm>
+      </p:grpSpPr>
+      <p:sp>
+        <p:nvSpPr>
+          <p:cNvPr id="2" name="Title 1"/>
+          <p:cNvSpPr>
+            <a:spLocks noGrp="1"/>
+          </p:cNvSpPr>
+          <p:nvPr>
+            <p:ph type="title"/>
+          </p:nvPr>
+        </p:nvSpPr>
+        <p:spPr/>
+        <p:txBody>
+          <a:bodyPr/>
+          <a:lstStyle/>
+          <a:p>
+            <a:r>
+              <a:rPr lang="en-US" dirty="0" smtClean="0"/>
+              <a:t>Parallel triggered transitions</a:t>
+            </a:r>
+            <a:endParaRPr lang="en-US" dirty="0"/>
+          </a:p>
+        </p:txBody>
+      </p:sp>
+      <p:sp>
+        <p:nvSpPr>
+          <p:cNvPr id="6" name="TextBox 5"/>
+          <p:cNvSpPr txBox="1"/>
+          <p:nvPr/>
+        </p:nvSpPr>
+        <p:spPr>
+          <a:xfrm>
+            <a:off x="4970834" y="1690688"/>
+            <a:ext cx="6468894" cy="4524315"/>
+          </a:xfrm>
+          <a:prstGeom prst="rect">
+            <a:avLst/>
+          </a:prstGeom>
+          <a:noFill/>
+        </p:spPr>
+        <p:txBody>
+          <a:bodyPr wrap="square" rtlCol="0">
+            <a:spAutoFit/>
+          </a:bodyPr>
+          <a:lstStyle/>
+          <a:p>
+            <a:r>
+              <a:rPr lang="en-US" dirty="0" smtClean="0"/>
+              <a:t>To avoid this problem, we allow </a:t>
+            </a:r>
+            <a:r>
+              <a:rPr lang="en-US" smtClean="0"/>
+              <a:t>more non-determinism in the abstract levels</a:t>
+            </a:r>
+            <a:endParaRPr lang="en-US" dirty="0" smtClean="0"/>
+          </a:p>
+          <a:p>
+            <a:endParaRPr lang="en-US" dirty="0" smtClean="0"/>
+          </a:p>
+          <a:p>
+            <a:r>
+              <a:rPr lang="en-US" dirty="0" smtClean="0"/>
+              <a:t>We need to add all of these options as a further 4 events:</a:t>
+            </a:r>
+          </a:p>
+          <a:p>
+            <a:endParaRPr lang="en-US" dirty="0" smtClean="0"/>
+          </a:p>
+          <a:p>
+            <a:r>
+              <a:rPr lang="en-US" dirty="0"/>
+              <a:t>E0: [~A &amp; ~C </a:t>
+            </a:r>
+            <a:r>
+              <a:rPr lang="en-US" dirty="0" smtClean="0"/>
+              <a:t>&amp; ~E &amp; </a:t>
+            </a:r>
+            <a:r>
+              <a:rPr lang="en-US" dirty="0"/>
+              <a:t>t]/</a:t>
+            </a:r>
+            <a:r>
+              <a:rPr lang="en-US" dirty="0" smtClean="0"/>
+              <a:t>skip</a:t>
+            </a:r>
+            <a:endParaRPr lang="en-US" dirty="0"/>
+          </a:p>
+          <a:p>
+            <a:r>
+              <a:rPr lang="en-US" dirty="0" smtClean="0"/>
+              <a:t>E1: [A &amp; ~C &amp; ~E &amp;  t]/ T1 </a:t>
+            </a:r>
+          </a:p>
+          <a:p>
+            <a:r>
+              <a:rPr lang="en-US" dirty="0" smtClean="0"/>
+              <a:t>E2: [~A &amp; C &amp; ~E &amp; t]/ T2</a:t>
+            </a:r>
+          </a:p>
+          <a:p>
+            <a:r>
+              <a:rPr lang="en-US" dirty="0" smtClean="0"/>
+              <a:t>E3: [A &amp; C &amp; ~E &amp; t]/ (T1 || T2)</a:t>
+            </a:r>
+          </a:p>
+          <a:p>
+            <a:r>
+              <a:rPr lang="en-US" dirty="0" smtClean="0"/>
+              <a:t>E4: [~A &amp; ~C &amp; E &amp; t]/ T3</a:t>
+            </a:r>
+          </a:p>
+          <a:p>
+            <a:r>
+              <a:rPr lang="en-US" dirty="0" smtClean="0"/>
+              <a:t>E5: [A &amp; ~C &amp; E &amp; t]/ (T1 || T3) 	(refines E1)</a:t>
+            </a:r>
+          </a:p>
+          <a:p>
+            <a:r>
+              <a:rPr lang="en-US" dirty="0" smtClean="0"/>
+              <a:t>E6: [~A &amp; C &amp; E &amp; t]/ (T2 || T3 )	(refines E2)</a:t>
+            </a:r>
+          </a:p>
+          <a:p>
+            <a:r>
+              <a:rPr lang="en-US" dirty="0" smtClean="0"/>
+              <a:t>E7: [A &amp; C &amp; E &amp; t]/ (T1 || T2 || T3) 	(refines E3)</a:t>
+            </a:r>
+          </a:p>
+          <a:p>
+            <a:endParaRPr lang="en-US" dirty="0"/>
+          </a:p>
+          <a:p>
+            <a:r>
+              <a:rPr lang="en-US" dirty="0" smtClean="0"/>
+              <a:t>In all cases additional clauses are added to guards hence strengthening them.</a:t>
+            </a:r>
+            <a:endParaRPr lang="en-US" dirty="0"/>
+          </a:p>
+        </p:txBody>
+      </p:sp>
+      <p:pic>
+        <p:nvPicPr>
+          <p:cNvPr id="3" name="Picture 2"/>
+          <p:cNvPicPr>
+            <a:picLocks noChangeAspect="1"/>
+          </p:cNvPicPr>
+          <p:nvPr/>
+        </p:nvPicPr>
+        <p:blipFill>
+          <a:blip r:embed="rId2"/>
+          <a:stretch>
+            <a:fillRect/>
+          </a:stretch>
+        </p:blipFill>
+        <p:spPr>
+          <a:xfrm>
+            <a:off x="246434" y="1533323"/>
+            <a:ext cx="4724400" cy="4686300"/>
+          </a:xfrm>
+          <a:prstGeom prst="rect">
+            <a:avLst/>
+          </a:prstGeom>
+        </p:spPr>
+      </p:pic>
+    </p:spTree>
+    <p:extLst>
+      <p:ext uri="{BB962C8B-B14F-4D97-AF65-F5344CB8AC3E}">
+        <p14:creationId xmlns:p14="http://schemas.microsoft.com/office/powerpoint/2010/main" val="997079981"/>
+      </p:ext>
+    </p:extLst>
+  </p:cSld>
+  <p:clrMapOvr>
+    <a:masterClrMapping/>
+  </p:clrMapOvr>
+</p:sld>
+</file>
+
+<file path=ppt/slides/slide6.xml><?xml version="1.0" encoding="utf-8"?>
 <p:sld xmlns:a="http://schemas.openxmlformats.org/drawingml/2006/main" xmlns:r="http://schemas.openxmlformats.org/officeDocument/2006/relationships" xmlns:p="http://schemas.openxmlformats.org/presentationml/2006/main">
   <p:cSld>
     <p:spTree>

</xml_diff>